<commit_message>
Added all Powerpoint presentations.
</commit_message>
<xml_diff>
--- a/ml-subjects/GAN.pptx
+++ b/ml-subjects/GAN.pptx
@@ -14,10 +14,10 @@
     <p:sldId id="260" r:id="rId5"/>
     <p:sldId id="261" r:id="rId6"/>
     <p:sldId id="262" r:id="rId7"/>
-    <p:sldId id="263" r:id="rId8"/>
-    <p:sldId id="264" r:id="rId9"/>
-    <p:sldId id="257" r:id="rId10"/>
-    <p:sldId id="265" r:id="rId11"/>
+    <p:sldId id="257" r:id="rId8"/>
+    <p:sldId id="263" r:id="rId9"/>
+    <p:sldId id="265" r:id="rId10"/>
+    <p:sldId id="264" r:id="rId11"/>
   </p:sldIdLst>
   <p:sldSz cx="9144000" cy="6858000" type="screen4x3"/>
   <p:notesSz cx="6858000" cy="9144000"/>
@@ -232,7 +232,7 @@
             <a:fld id="{D9C8E9B5-BDE3-4B8B-9CB9-F9711AFA1353}" type="datetimeFigureOut">
               <a:rPr lang="en-US" smtClean="0"/>
               <a:pPr/>
-              <a:t>11/27/2019</a:t>
+              <a:t>11/28/2019</a:t>
             </a:fld>
             <a:endParaRPr lang="en-US"/>
           </a:p>
@@ -875,7 +875,7 @@
             <a:fld id="{1D8BD707-D9CF-40AE-B4C6-C98DA3205C09}" type="datetimeFigureOut">
               <a:rPr lang="en-US" smtClean="0"/>
               <a:pPr/>
-              <a:t>11/27/2019</a:t>
+              <a:t>11/28/2019</a:t>
             </a:fld>
             <a:endParaRPr lang="en-US"/>
           </a:p>
@@ -1117,7 +1117,7 @@
             <a:fld id="{1D8BD707-D9CF-40AE-B4C6-C98DA3205C09}" type="datetimeFigureOut">
               <a:rPr lang="en-US" smtClean="0"/>
               <a:pPr/>
-              <a:t>11/27/2019</a:t>
+              <a:t>11/28/2019</a:t>
             </a:fld>
             <a:endParaRPr lang="en-US"/>
           </a:p>
@@ -1302,7 +1302,7 @@
             <a:fld id="{1D8BD707-D9CF-40AE-B4C6-C98DA3205C09}" type="datetimeFigureOut">
               <a:rPr lang="en-US" smtClean="0"/>
               <a:pPr/>
-              <a:t>11/27/2019</a:t>
+              <a:t>11/28/2019</a:t>
             </a:fld>
             <a:endParaRPr lang="en-US"/>
           </a:p>
@@ -1524,7 +1524,7 @@
             <a:fld id="{1D8BD707-D9CF-40AE-B4C6-C98DA3205C09}" type="datetimeFigureOut">
               <a:rPr lang="en-US" smtClean="0"/>
               <a:pPr/>
-              <a:t>11/27/2019</a:t>
+              <a:t>11/28/2019</a:t>
             </a:fld>
             <a:endParaRPr lang="en-US"/>
           </a:p>
@@ -1842,7 +1842,7 @@
             <a:fld id="{1D8BD707-D9CF-40AE-B4C6-C98DA3205C09}" type="datetimeFigureOut">
               <a:rPr lang="en-US" smtClean="0"/>
               <a:pPr/>
-              <a:t>11/27/2019</a:t>
+              <a:t>11/28/2019</a:t>
             </a:fld>
             <a:endParaRPr lang="en-US"/>
           </a:p>
@@ -2135,7 +2135,7 @@
             <a:fld id="{1D8BD707-D9CF-40AE-B4C6-C98DA3205C09}" type="datetimeFigureOut">
               <a:rPr lang="en-US" smtClean="0"/>
               <a:pPr/>
-              <a:t>11/27/2019</a:t>
+              <a:t>11/28/2019</a:t>
             </a:fld>
             <a:endParaRPr lang="en-US"/>
           </a:p>
@@ -2562,7 +2562,7 @@
             <a:fld id="{1D8BD707-D9CF-40AE-B4C6-C98DA3205C09}" type="datetimeFigureOut">
               <a:rPr lang="en-US" smtClean="0"/>
               <a:pPr/>
-              <a:t>11/27/2019</a:t>
+              <a:t>11/28/2019</a:t>
             </a:fld>
             <a:endParaRPr lang="en-US"/>
           </a:p>
@@ -2685,7 +2685,7 @@
             <a:fld id="{1D8BD707-D9CF-40AE-B4C6-C98DA3205C09}" type="datetimeFigureOut">
               <a:rPr lang="en-US" smtClean="0"/>
               <a:pPr/>
-              <a:t>11/27/2019</a:t>
+              <a:t>11/28/2019</a:t>
             </a:fld>
             <a:endParaRPr lang="en-US"/>
           </a:p>
@@ -2785,7 +2785,7 @@
             <a:fld id="{1D8BD707-D9CF-40AE-B4C6-C98DA3205C09}" type="datetimeFigureOut">
               <a:rPr lang="en-US" smtClean="0"/>
               <a:pPr/>
-              <a:t>11/27/2019</a:t>
+              <a:t>11/28/2019</a:t>
             </a:fld>
             <a:endParaRPr lang="en-US"/>
           </a:p>
@@ -3067,7 +3067,7 @@
             <a:fld id="{1D8BD707-D9CF-40AE-B4C6-C98DA3205C09}" type="datetimeFigureOut">
               <a:rPr lang="en-US" smtClean="0"/>
               <a:pPr/>
-              <a:t>11/27/2019</a:t>
+              <a:t>11/28/2019</a:t>
             </a:fld>
             <a:endParaRPr lang="en-US"/>
           </a:p>
@@ -3325,7 +3325,7 @@
             <a:fld id="{1D8BD707-D9CF-40AE-B4C6-C98DA3205C09}" type="datetimeFigureOut">
               <a:rPr lang="en-US" smtClean="0"/>
               <a:pPr/>
-              <a:t>11/27/2019</a:t>
+              <a:t>11/28/2019</a:t>
             </a:fld>
             <a:endParaRPr lang="en-US"/>
           </a:p>
@@ -3538,7 +3538,7 @@
             <a:fld id="{1D8BD707-D9CF-40AE-B4C6-C98DA3205C09}" type="datetimeFigureOut">
               <a:rPr lang="en-US" smtClean="0"/>
               <a:pPr/>
-              <a:t>11/27/2019</a:t>
+              <a:t>11/28/2019</a:t>
             </a:fld>
             <a:endParaRPr lang="en-US"/>
           </a:p>
@@ -4182,7 +4182,7 @@
           <a:p>
             <a:r>
               <a:rPr lang="it-IT" dirty="0" smtClean="0"/>
-              <a:t>This Person Does Not Exist</a:t>
+              <a:t>Evolutionary GAML</a:t>
             </a:r>
             <a:endParaRPr lang="fr-FR" dirty="0"/>
           </a:p>
@@ -4200,74 +4200,77 @@
         </p:nvSpPr>
         <p:spPr/>
         <p:txBody>
-          <a:bodyPr>
-            <a:normAutofit/>
-          </a:bodyPr>
-          <a:lstStyle/>
-          <a:p>
+          <a:bodyPr/>
+          <a:lstStyle/>
+          <a:p>
+            <a:r>
+              <a:rPr lang="en-US" i="1" dirty="0" smtClean="0"/>
+              <a:t>One </a:t>
+            </a:r>
+            <a:r>
+              <a:rPr lang="en-US" i="1" dirty="0"/>
+              <a:t>Pixel Attack for Fooling Deep Neural </a:t>
+            </a:r>
+            <a:r>
+              <a:rPr lang="en-US" i="1" dirty="0" smtClean="0"/>
+              <a:t>Networks</a:t>
+            </a:r>
+            <a:r>
+              <a:rPr lang="en-US" dirty="0" smtClean="0"/>
+              <a:t>, </a:t>
+            </a:r>
+            <a:r>
+              <a:rPr lang="fr-FR" dirty="0"/>
+              <a:t>Su, </a:t>
+            </a:r>
+            <a:r>
+              <a:rPr lang="fr-FR" dirty="0" err="1"/>
+              <a:t>Vasconcellos</a:t>
+            </a:r>
+            <a:r>
+              <a:rPr lang="fr-FR" dirty="0"/>
+              <a:t> Vargas, </a:t>
+            </a:r>
+            <a:r>
+              <a:rPr lang="fr-FR" dirty="0" err="1"/>
+              <a:t>Sakurai</a:t>
+            </a:r>
+            <a:r>
+              <a:rPr lang="fr-FR" dirty="0"/>
+              <a:t> (2019</a:t>
+            </a:r>
+            <a:r>
+              <a:rPr lang="fr-FR" dirty="0" smtClean="0"/>
+              <a:t>)</a:t>
+            </a:r>
+          </a:p>
+          <a:p>
+            <a:r>
+              <a:rPr lang="it-IT" i="1" dirty="0" smtClean="0"/>
+              <a:t>Universal Rules for Fooling Deep Neural Networks based Text Classification</a:t>
+            </a:r>
+            <a:r>
+              <a:rPr lang="it-IT" dirty="0"/>
+              <a:t> </a:t>
+            </a:r>
             <a:r>
               <a:rPr lang="it-IT" dirty="0" smtClean="0"/>
-              <a:t>DNN face classification (or similar task)</a:t>
-            </a:r>
-          </a:p>
-          <a:p>
-            <a:r>
-              <a:rPr lang="it-IT" dirty="0" smtClean="0"/>
-              <a:t>Take N last layers as an embedding (weights of the NN)</a:t>
-            </a:r>
-          </a:p>
-          <a:p>
-            <a:r>
-              <a:rPr lang="it-IT" dirty="0" smtClean="0"/>
-              <a:t>Every input is a point in the embedding</a:t>
-            </a:r>
-          </a:p>
-          <a:p>
-            <a:r>
-              <a:rPr lang="it-IT" dirty="0" smtClean="0"/>
-              <a:t>Interpolate points -&gt; go back to inputs (pixels)</a:t>
-            </a:r>
-          </a:p>
-          <a:p>
-            <a:endParaRPr lang="it-IT" dirty="0"/>
-          </a:p>
-          <a:p>
-            <a:r>
-              <a:rPr lang="fr-FR" dirty="0" smtClean="0">
-                <a:hlinkClick r:id="rId2"/>
-              </a:rPr>
-              <a:t>https</a:t>
-            </a:r>
-            <a:r>
-              <a:rPr lang="fr-FR" dirty="0">
-                <a:hlinkClick r:id="rId2"/>
-              </a:rPr>
-              <a:t>://thispersondoesnotexist.com/</a:t>
-            </a:r>
-            <a:endParaRPr lang="fr-FR" dirty="0"/>
-          </a:p>
-          <a:p>
-            <a:endParaRPr lang="it-IT" dirty="0" smtClean="0"/>
+              <a:t>(2019)</a:t>
+            </a:r>
+            <a:endParaRPr lang="fr-FR" i="1" dirty="0"/>
           </a:p>
         </p:txBody>
       </p:sp>
     </p:spTree>
     <p:extLst>
       <p:ext uri="{BB962C8B-B14F-4D97-AF65-F5344CB8AC3E}">
-        <p14:creationId xmlns:p14="http://schemas.microsoft.com/office/powerpoint/2010/main" val="2637585720"/>
+        <p14:creationId xmlns:p14="http://schemas.microsoft.com/office/powerpoint/2010/main" val="1623247444"/>
       </p:ext>
     </p:extLst>
   </p:cSld>
   <p:clrMapOvr>
     <a:masterClrMapping/>
   </p:clrMapOvr>
-  <p:timing>
-    <p:tnLst>
-      <p:par>
-        <p:cTn id="1" dur="indefinite" restart="never" nodeType="tmRoot"/>
-      </p:par>
-    </p:tnLst>
-  </p:timing>
 </p:sld>
 </file>
 
@@ -4486,7 +4489,15 @@
             <a:pPr lvl="1"/>
             <a:r>
               <a:rPr lang="en-US" dirty="0" smtClean="0"/>
-              <a:t>“B” contains human expertise</a:t>
+              <a:t>“B” </a:t>
+            </a:r>
+            <a:r>
+              <a:rPr lang="en-US" dirty="0" smtClean="0"/>
+              <a:t>may contain human </a:t>
+            </a:r>
+            <a:r>
+              <a:rPr lang="en-US" dirty="0" smtClean="0"/>
+              <a:t>expertise</a:t>
             </a:r>
           </a:p>
         </p:txBody>
@@ -6449,293 +6460,6 @@
           <a:lstStyle/>
           <a:p>
             <a:r>
-              <a:rPr lang="it-IT" dirty="0"/>
-              <a:t>Generative Adversarial ML</a:t>
-            </a:r>
-            <a:endParaRPr lang="en-US" dirty="0"/>
-          </a:p>
-        </p:txBody>
-      </p:sp>
-      <p:sp>
-        <p:nvSpPr>
-          <p:cNvPr id="3" name="Espace réservé du contenu 2"/>
-          <p:cNvSpPr>
-            <a:spLocks noGrp="1"/>
-          </p:cNvSpPr>
-          <p:nvPr>
-            <p:ph idx="1"/>
-          </p:nvPr>
-        </p:nvSpPr>
-        <p:spPr/>
-        <p:txBody>
-          <a:bodyPr/>
-          <a:lstStyle/>
-          <a:p>
-            <a:endParaRPr lang="en-US"/>
-          </a:p>
-        </p:txBody>
-      </p:sp>
-      <p:pic>
-        <p:nvPicPr>
-          <p:cNvPr id="6146" name="Picture 2" descr="Risultati immagini per adversarial machine learning"/>
-          <p:cNvPicPr>
-            <a:picLocks noChangeAspect="1" noChangeArrowheads="1"/>
-          </p:cNvPicPr>
-          <p:nvPr/>
-        </p:nvPicPr>
-        <p:blipFill>
-          <a:blip r:embed="rId2">
-            <a:extLst>
-              <a:ext uri="{28A0092B-C50C-407E-A947-70E740481C1C}">
-                <a14:useLocalDpi xmlns:a14="http://schemas.microsoft.com/office/drawing/2010/main" val="0"/>
-              </a:ext>
-            </a:extLst>
-          </a:blip>
-          <a:srcRect/>
-          <a:stretch>
-            <a:fillRect/>
-          </a:stretch>
-        </p:blipFill>
-        <p:spPr bwMode="auto">
-          <a:xfrm>
-            <a:off x="747712" y="1838324"/>
-            <a:ext cx="7648575" cy="4638676"/>
-          </a:xfrm>
-          <a:prstGeom prst="rect">
-            <a:avLst/>
-          </a:prstGeom>
-          <a:noFill/>
-          <a:extLst>
-            <a:ext uri="{909E8E84-426E-40DD-AFC4-6F175D3DCCD1}">
-              <a14:hiddenFill xmlns:a14="http://schemas.microsoft.com/office/drawing/2010/main">
-                <a:solidFill>
-                  <a:srgbClr val="FFFFFF"/>
-                </a:solidFill>
-              </a14:hiddenFill>
-            </a:ext>
-          </a:extLst>
-        </p:spPr>
-      </p:pic>
-      <p:sp>
-        <p:nvSpPr>
-          <p:cNvPr id="4" name="Rectangle 3"/>
-          <p:cNvSpPr/>
-          <p:nvPr/>
-        </p:nvSpPr>
-        <p:spPr>
-          <a:xfrm>
-            <a:off x="2133599" y="1318419"/>
-            <a:ext cx="4876800" cy="563562"/>
-          </a:xfrm>
-          <a:prstGeom prst="rect">
-            <a:avLst/>
-          </a:prstGeom>
-        </p:spPr>
-        <p:style>
-          <a:lnRef idx="2">
-            <a:schemeClr val="dk1"/>
-          </a:lnRef>
-          <a:fillRef idx="1">
-            <a:schemeClr val="lt1"/>
-          </a:fillRef>
-          <a:effectRef idx="0">
-            <a:schemeClr val="dk1"/>
-          </a:effectRef>
-          <a:fontRef idx="minor">
-            <a:schemeClr val="dk1"/>
-          </a:fontRef>
-        </p:style>
-        <p:txBody>
-          <a:bodyPr rtlCol="0" anchor="ctr"/>
-          <a:lstStyle/>
-          <a:p>
-            <a:pPr algn="ctr"/>
-            <a:r>
-              <a:rPr lang="en-US"/>
-              <a:t>Robust Physical-World Attacks on Deep Learning Models: https://arxiv.org/pdf/1707.08945.pdf</a:t>
-            </a:r>
-          </a:p>
-        </p:txBody>
-      </p:sp>
-    </p:spTree>
-    <p:extLst>
-      <p:ext uri="{BB962C8B-B14F-4D97-AF65-F5344CB8AC3E}">
-        <p14:creationId xmlns:p14="http://schemas.microsoft.com/office/powerpoint/2010/main" val="876218522"/>
-      </p:ext>
-    </p:extLst>
-  </p:cSld>
-  <p:clrMapOvr>
-    <a:masterClrMapping/>
-  </p:clrMapOvr>
-  <p:timing>
-    <p:tnLst>
-      <p:par>
-        <p:cTn id="1" dur="indefinite" restart="never" nodeType="tmRoot"/>
-      </p:par>
-    </p:tnLst>
-  </p:timing>
-</p:sld>
-</file>
-
-<file path=ppt/slides/slide8.xml><?xml version="1.0" encoding="utf-8"?>
-<p:sld xmlns:a="http://schemas.openxmlformats.org/drawingml/2006/main" xmlns:r="http://schemas.openxmlformats.org/officeDocument/2006/relationships" xmlns:p="http://schemas.openxmlformats.org/presentationml/2006/main">
-  <p:cSld>
-    <p:spTree>
-      <p:nvGrpSpPr>
-        <p:cNvPr id="1" name=""/>
-        <p:cNvGrpSpPr/>
-        <p:nvPr/>
-      </p:nvGrpSpPr>
-      <p:grpSpPr>
-        <a:xfrm>
-          <a:off x="0" y="0"/>
-          <a:ext cx="0" cy="0"/>
-          <a:chOff x="0" y="0"/>
-          <a:chExt cx="0" cy="0"/>
-        </a:xfrm>
-      </p:grpSpPr>
-      <p:sp>
-        <p:nvSpPr>
-          <p:cNvPr id="2" name="Titre 1"/>
-          <p:cNvSpPr>
-            <a:spLocks noGrp="1"/>
-          </p:cNvSpPr>
-          <p:nvPr>
-            <p:ph type="title"/>
-          </p:nvPr>
-        </p:nvSpPr>
-        <p:spPr/>
-        <p:txBody>
-          <a:bodyPr/>
-          <a:lstStyle/>
-          <a:p>
-            <a:r>
-              <a:rPr lang="it-IT" dirty="0" smtClean="0"/>
-              <a:t>Evolutionary GAML</a:t>
-            </a:r>
-            <a:endParaRPr lang="fr-FR" dirty="0"/>
-          </a:p>
-        </p:txBody>
-      </p:sp>
-      <p:sp>
-        <p:nvSpPr>
-          <p:cNvPr id="3" name="Espace réservé du contenu 2"/>
-          <p:cNvSpPr>
-            <a:spLocks noGrp="1"/>
-          </p:cNvSpPr>
-          <p:nvPr>
-            <p:ph idx="1"/>
-          </p:nvPr>
-        </p:nvSpPr>
-        <p:spPr/>
-        <p:txBody>
-          <a:bodyPr/>
-          <a:lstStyle/>
-          <a:p>
-            <a:r>
-              <a:rPr lang="en-US" i="1" dirty="0" smtClean="0"/>
-              <a:t>One </a:t>
-            </a:r>
-            <a:r>
-              <a:rPr lang="en-US" i="1" dirty="0"/>
-              <a:t>Pixel Attack for Fooling Deep Neural </a:t>
-            </a:r>
-            <a:r>
-              <a:rPr lang="en-US" i="1" dirty="0" smtClean="0"/>
-              <a:t>Networks</a:t>
-            </a:r>
-            <a:r>
-              <a:rPr lang="en-US" dirty="0" smtClean="0"/>
-              <a:t>, </a:t>
-            </a:r>
-            <a:r>
-              <a:rPr lang="fr-FR" dirty="0"/>
-              <a:t>Su, </a:t>
-            </a:r>
-            <a:r>
-              <a:rPr lang="fr-FR" dirty="0" err="1"/>
-              <a:t>Vasconcellos</a:t>
-            </a:r>
-            <a:r>
-              <a:rPr lang="fr-FR" dirty="0"/>
-              <a:t> Vargas, </a:t>
-            </a:r>
-            <a:r>
-              <a:rPr lang="fr-FR" dirty="0" err="1"/>
-              <a:t>Sakurai</a:t>
-            </a:r>
-            <a:r>
-              <a:rPr lang="fr-FR" dirty="0"/>
-              <a:t> (2019</a:t>
-            </a:r>
-            <a:r>
-              <a:rPr lang="fr-FR" dirty="0" smtClean="0"/>
-              <a:t>)</a:t>
-            </a:r>
-          </a:p>
-          <a:p>
-            <a:r>
-              <a:rPr lang="it-IT" i="1" dirty="0" smtClean="0"/>
-              <a:t>Universal Rules for Fooling Deep Neural Networks based Text Classification</a:t>
-            </a:r>
-            <a:r>
-              <a:rPr lang="it-IT" dirty="0"/>
-              <a:t> </a:t>
-            </a:r>
-            <a:r>
-              <a:rPr lang="it-IT" dirty="0" smtClean="0"/>
-              <a:t>(2019)</a:t>
-            </a:r>
-            <a:endParaRPr lang="fr-FR" i="1" dirty="0"/>
-          </a:p>
-        </p:txBody>
-      </p:sp>
-    </p:spTree>
-    <p:extLst>
-      <p:ext uri="{BB962C8B-B14F-4D97-AF65-F5344CB8AC3E}">
-        <p14:creationId xmlns:p14="http://schemas.microsoft.com/office/powerpoint/2010/main" val="1623247444"/>
-      </p:ext>
-    </p:extLst>
-  </p:cSld>
-  <p:clrMapOvr>
-    <a:masterClrMapping/>
-  </p:clrMapOvr>
-</p:sld>
-</file>
-
-<file path=ppt/slides/slide9.xml><?xml version="1.0" encoding="utf-8"?>
-<p:sld xmlns:a="http://schemas.openxmlformats.org/drawingml/2006/main" xmlns:r="http://schemas.openxmlformats.org/officeDocument/2006/relationships" xmlns:p="http://schemas.openxmlformats.org/presentationml/2006/main">
-  <p:cSld>
-    <p:spTree>
-      <p:nvGrpSpPr>
-        <p:cNvPr id="1" name=""/>
-        <p:cNvGrpSpPr/>
-        <p:nvPr/>
-      </p:nvGrpSpPr>
-      <p:grpSpPr>
-        <a:xfrm>
-          <a:off x="0" y="0"/>
-          <a:ext cx="0" cy="0"/>
-          <a:chOff x="0" y="0"/>
-          <a:chExt cx="0" cy="0"/>
-        </a:xfrm>
-      </p:grpSpPr>
-      <p:sp>
-        <p:nvSpPr>
-          <p:cNvPr id="2" name="Titre 1"/>
-          <p:cNvSpPr>
-            <a:spLocks noGrp="1"/>
-          </p:cNvSpPr>
-          <p:nvPr>
-            <p:ph type="title"/>
-          </p:nvPr>
-        </p:nvSpPr>
-        <p:spPr/>
-        <p:txBody>
-          <a:bodyPr/>
-          <a:lstStyle/>
-          <a:p>
-            <a:r>
               <a:rPr lang="it-IT" dirty="0" smtClean="0"/>
               <a:t>Generative Adversarial ML</a:t>
             </a:r>
@@ -6807,6 +6531,297 @@
     <p:extLst>
       <p:ext uri="{BB962C8B-B14F-4D97-AF65-F5344CB8AC3E}">
         <p14:creationId xmlns:p14="http://schemas.microsoft.com/office/powerpoint/2010/main" val="3221085892"/>
+      </p:ext>
+    </p:extLst>
+  </p:cSld>
+  <p:clrMapOvr>
+    <a:masterClrMapping/>
+  </p:clrMapOvr>
+  <p:timing>
+    <p:tnLst>
+      <p:par>
+        <p:cTn id="1" dur="indefinite" restart="never" nodeType="tmRoot"/>
+      </p:par>
+    </p:tnLst>
+  </p:timing>
+</p:sld>
+</file>
+
+<file path=ppt/slides/slide8.xml><?xml version="1.0" encoding="utf-8"?>
+<p:sld xmlns:a="http://schemas.openxmlformats.org/drawingml/2006/main" xmlns:r="http://schemas.openxmlformats.org/officeDocument/2006/relationships" xmlns:p="http://schemas.openxmlformats.org/presentationml/2006/main">
+  <p:cSld>
+    <p:spTree>
+      <p:nvGrpSpPr>
+        <p:cNvPr id="1" name=""/>
+        <p:cNvGrpSpPr/>
+        <p:nvPr/>
+      </p:nvGrpSpPr>
+      <p:grpSpPr>
+        <a:xfrm>
+          <a:off x="0" y="0"/>
+          <a:ext cx="0" cy="0"/>
+          <a:chOff x="0" y="0"/>
+          <a:chExt cx="0" cy="0"/>
+        </a:xfrm>
+      </p:grpSpPr>
+      <p:sp>
+        <p:nvSpPr>
+          <p:cNvPr id="2" name="Titre 1"/>
+          <p:cNvSpPr>
+            <a:spLocks noGrp="1"/>
+          </p:cNvSpPr>
+          <p:nvPr>
+            <p:ph type="title"/>
+          </p:nvPr>
+        </p:nvSpPr>
+        <p:spPr/>
+        <p:txBody>
+          <a:bodyPr/>
+          <a:lstStyle/>
+          <a:p>
+            <a:r>
+              <a:rPr lang="it-IT" dirty="0"/>
+              <a:t>Generative Adversarial ML</a:t>
+            </a:r>
+            <a:endParaRPr lang="en-US" dirty="0"/>
+          </a:p>
+        </p:txBody>
+      </p:sp>
+      <p:sp>
+        <p:nvSpPr>
+          <p:cNvPr id="3" name="Espace réservé du contenu 2"/>
+          <p:cNvSpPr>
+            <a:spLocks noGrp="1"/>
+          </p:cNvSpPr>
+          <p:nvPr>
+            <p:ph idx="1"/>
+          </p:nvPr>
+        </p:nvSpPr>
+        <p:spPr/>
+        <p:txBody>
+          <a:bodyPr/>
+          <a:lstStyle/>
+          <a:p>
+            <a:endParaRPr lang="en-US"/>
+          </a:p>
+        </p:txBody>
+      </p:sp>
+      <p:pic>
+        <p:nvPicPr>
+          <p:cNvPr id="6146" name="Picture 2" descr="Risultati immagini per adversarial machine learning"/>
+          <p:cNvPicPr>
+            <a:picLocks noChangeAspect="1" noChangeArrowheads="1"/>
+          </p:cNvPicPr>
+          <p:nvPr/>
+        </p:nvPicPr>
+        <p:blipFill>
+          <a:blip r:embed="rId2">
+            <a:extLst>
+              <a:ext uri="{28A0092B-C50C-407E-A947-70E740481C1C}">
+                <a14:useLocalDpi xmlns:a14="http://schemas.microsoft.com/office/drawing/2010/main" val="0"/>
+              </a:ext>
+            </a:extLst>
+          </a:blip>
+          <a:srcRect/>
+          <a:stretch>
+            <a:fillRect/>
+          </a:stretch>
+        </p:blipFill>
+        <p:spPr bwMode="auto">
+          <a:xfrm>
+            <a:off x="747712" y="1838324"/>
+            <a:ext cx="7648575" cy="4638676"/>
+          </a:xfrm>
+          <a:prstGeom prst="rect">
+            <a:avLst/>
+          </a:prstGeom>
+          <a:noFill/>
+          <a:extLst>
+            <a:ext uri="{909E8E84-426E-40DD-AFC4-6F175D3DCCD1}">
+              <a14:hiddenFill xmlns:a14="http://schemas.microsoft.com/office/drawing/2010/main">
+                <a:solidFill>
+                  <a:srgbClr val="FFFFFF"/>
+                </a:solidFill>
+              </a14:hiddenFill>
+            </a:ext>
+          </a:extLst>
+        </p:spPr>
+      </p:pic>
+      <p:sp>
+        <p:nvSpPr>
+          <p:cNvPr id="4" name="Rectangle 3"/>
+          <p:cNvSpPr/>
+          <p:nvPr/>
+        </p:nvSpPr>
+        <p:spPr>
+          <a:xfrm>
+            <a:off x="2133599" y="1318419"/>
+            <a:ext cx="4876800" cy="563562"/>
+          </a:xfrm>
+          <a:prstGeom prst="rect">
+            <a:avLst/>
+          </a:prstGeom>
+        </p:spPr>
+        <p:style>
+          <a:lnRef idx="2">
+            <a:schemeClr val="dk1"/>
+          </a:lnRef>
+          <a:fillRef idx="1">
+            <a:schemeClr val="lt1"/>
+          </a:fillRef>
+          <a:effectRef idx="0">
+            <a:schemeClr val="dk1"/>
+          </a:effectRef>
+          <a:fontRef idx="minor">
+            <a:schemeClr val="dk1"/>
+          </a:fontRef>
+        </p:style>
+        <p:txBody>
+          <a:bodyPr rtlCol="0" anchor="ctr"/>
+          <a:lstStyle/>
+          <a:p>
+            <a:pPr algn="ctr"/>
+            <a:r>
+              <a:rPr lang="en-US"/>
+              <a:t>Robust Physical-World Attacks on Deep Learning Models: https://arxiv.org/pdf/1707.08945.pdf</a:t>
+            </a:r>
+          </a:p>
+        </p:txBody>
+      </p:sp>
+    </p:spTree>
+    <p:extLst>
+      <p:ext uri="{BB962C8B-B14F-4D97-AF65-F5344CB8AC3E}">
+        <p14:creationId xmlns:p14="http://schemas.microsoft.com/office/powerpoint/2010/main" val="876218522"/>
+      </p:ext>
+    </p:extLst>
+  </p:cSld>
+  <p:clrMapOvr>
+    <a:masterClrMapping/>
+  </p:clrMapOvr>
+  <p:timing>
+    <p:tnLst>
+      <p:par>
+        <p:cTn id="1" dur="indefinite" restart="never" nodeType="tmRoot"/>
+      </p:par>
+    </p:tnLst>
+  </p:timing>
+</p:sld>
+</file>
+
+<file path=ppt/slides/slide9.xml><?xml version="1.0" encoding="utf-8"?>
+<p:sld xmlns:a="http://schemas.openxmlformats.org/drawingml/2006/main" xmlns:r="http://schemas.openxmlformats.org/officeDocument/2006/relationships" xmlns:p="http://schemas.openxmlformats.org/presentationml/2006/main">
+  <p:cSld>
+    <p:spTree>
+      <p:nvGrpSpPr>
+        <p:cNvPr id="1" name=""/>
+        <p:cNvGrpSpPr/>
+        <p:nvPr/>
+      </p:nvGrpSpPr>
+      <p:grpSpPr>
+        <a:xfrm>
+          <a:off x="0" y="0"/>
+          <a:ext cx="0" cy="0"/>
+          <a:chOff x="0" y="0"/>
+          <a:chExt cx="0" cy="0"/>
+        </a:xfrm>
+      </p:grpSpPr>
+      <p:sp>
+        <p:nvSpPr>
+          <p:cNvPr id="2" name="Titre 1"/>
+          <p:cNvSpPr>
+            <a:spLocks noGrp="1"/>
+          </p:cNvSpPr>
+          <p:nvPr>
+            <p:ph type="title"/>
+          </p:nvPr>
+        </p:nvSpPr>
+        <p:spPr/>
+        <p:txBody>
+          <a:bodyPr/>
+          <a:lstStyle/>
+          <a:p>
+            <a:r>
+              <a:rPr lang="it-IT" dirty="0" smtClean="0"/>
+              <a:t>This Person Does Not Exist</a:t>
+            </a:r>
+            <a:endParaRPr lang="fr-FR" dirty="0"/>
+          </a:p>
+        </p:txBody>
+      </p:sp>
+      <p:sp>
+        <p:nvSpPr>
+          <p:cNvPr id="3" name="Espace réservé du contenu 2"/>
+          <p:cNvSpPr>
+            <a:spLocks noGrp="1"/>
+          </p:cNvSpPr>
+          <p:nvPr>
+            <p:ph idx="1"/>
+          </p:nvPr>
+        </p:nvSpPr>
+        <p:spPr/>
+        <p:txBody>
+          <a:bodyPr>
+            <a:normAutofit/>
+          </a:bodyPr>
+          <a:lstStyle/>
+          <a:p>
+            <a:r>
+              <a:rPr lang="it-IT" dirty="0" smtClean="0"/>
+              <a:t>Website for generation «fake» faces</a:t>
+            </a:r>
+          </a:p>
+          <a:p>
+            <a:pPr lvl="1"/>
+            <a:r>
+              <a:rPr lang="it-IT" dirty="0" smtClean="0"/>
+              <a:t>Generative Adversarial Network</a:t>
+            </a:r>
+          </a:p>
+          <a:p>
+            <a:pPr lvl="1"/>
+            <a:r>
+              <a:rPr lang="it-IT" dirty="0" smtClean="0"/>
+              <a:t>Trained on high-resolution images</a:t>
+            </a:r>
+          </a:p>
+          <a:p>
+            <a:pPr lvl="1"/>
+            <a:r>
+              <a:rPr lang="it-IT" dirty="0" smtClean="0"/>
+              <a:t>Very convicing, sometimes slight aberrations</a:t>
+            </a:r>
+            <a:endParaRPr lang="it-IT" dirty="0" smtClean="0"/>
+          </a:p>
+          <a:p>
+            <a:endParaRPr lang="it-IT" dirty="0"/>
+          </a:p>
+          <a:p>
+            <a:pPr marL="0" indent="0" algn="ctr">
+              <a:buNone/>
+            </a:pPr>
+            <a:r>
+              <a:rPr lang="fr-FR" sz="4000" dirty="0" smtClean="0">
+                <a:hlinkClick r:id="rId2"/>
+              </a:rPr>
+              <a:t>https</a:t>
+            </a:r>
+            <a:r>
+              <a:rPr lang="fr-FR" sz="4000" dirty="0">
+                <a:hlinkClick r:id="rId2"/>
+              </a:rPr>
+              <a:t>://thispersondoesnotexist.com/</a:t>
+            </a:r>
+            <a:endParaRPr lang="fr-FR" sz="4000" dirty="0"/>
+          </a:p>
+          <a:p>
+            <a:endParaRPr lang="it-IT" dirty="0" smtClean="0"/>
+          </a:p>
+        </p:txBody>
+      </p:sp>
+    </p:spTree>
+    <p:extLst>
+      <p:ext uri="{BB962C8B-B14F-4D97-AF65-F5344CB8AC3E}">
+        <p14:creationId xmlns:p14="http://schemas.microsoft.com/office/powerpoint/2010/main" val="2637585720"/>
       </p:ext>
     </p:extLst>
   </p:cSld>

</xml_diff>

<commit_message>
Committed final version of the Powerpoint presentations.
</commit_message>
<xml_diff>
--- a/ml-subjects/GAN.pptx
+++ b/ml-subjects/GAN.pptx
@@ -4489,15 +4489,7 @@
             <a:pPr lvl="1"/>
             <a:r>
               <a:rPr lang="en-US" dirty="0" smtClean="0"/>
-              <a:t>“B” </a:t>
-            </a:r>
-            <a:r>
-              <a:rPr lang="en-US" dirty="0" smtClean="0"/>
-              <a:t>may contain human </a:t>
-            </a:r>
-            <a:r>
-              <a:rPr lang="en-US" dirty="0" smtClean="0"/>
-              <a:t>expertise</a:t>
+              <a:t>“B” may contain human expertise</a:t>
             </a:r>
           </a:p>
         </p:txBody>
@@ -6790,7 +6782,6 @@
               <a:rPr lang="it-IT" dirty="0" smtClean="0"/>
               <a:t>Very convicing, sometimes slight aberrations</a:t>
             </a:r>
-            <a:endParaRPr lang="it-IT" dirty="0" smtClean="0"/>
           </a:p>
           <a:p>
             <a:endParaRPr lang="it-IT" dirty="0"/>

</xml_diff>